<commit_message>
Update diagram  + SortTest
</commit_message>
<xml_diff>
--- a/docs/diagrams/LogicComponentClassDiagram.pptx
+++ b/docs/diagrams/LogicComponentClassDiagram.pptx
@@ -3472,8 +3472,8 @@
         </p:nvSpPr>
         <p:spPr>
           <a:xfrm>
-            <a:off x="567791" y="243671"/>
-            <a:ext cx="7627218" cy="4949097"/>
+            <a:off x="567791" y="159935"/>
+            <a:ext cx="7627218" cy="5116569"/>
           </a:xfrm>
           <a:prstGeom prst="roundRect">
             <a:avLst>
@@ -3794,8 +3794,8 @@
         </p:nvSpPr>
         <p:spPr>
           <a:xfrm>
-            <a:off x="729303" y="5350569"/>
-            <a:ext cx="7431315" cy="328045"/>
+            <a:off x="567791" y="5350569"/>
+            <a:ext cx="8196417" cy="328045"/>
           </a:xfrm>
           <a:prstGeom prst="roundRect">
             <a:avLst/>
@@ -4393,7 +4393,7 @@
         </p:nvCxnSpPr>
         <p:spPr>
           <a:xfrm>
-            <a:off x="533400" y="2832505"/>
+            <a:off x="437908" y="2689227"/>
             <a:ext cx="419548" cy="2860"/>
           </a:xfrm>
           <a:prstGeom prst="bentConnector3">
@@ -6453,8 +6453,8 @@
         </p:nvSpPr>
         <p:spPr>
           <a:xfrm flipH="1">
-            <a:off x="2280496" y="3822735"/>
-            <a:ext cx="1438612" cy="330193"/>
+            <a:off x="2295797" y="3681631"/>
+            <a:ext cx="1438612" cy="443888"/>
           </a:xfrm>
           <a:prstGeom prst="rect">
             <a:avLst/>
@@ -6485,12 +6485,23 @@
           <a:p>
             <a:pPr algn="ctr"/>
             <a:r>
+              <a:rPr lang="en-US" sz="1050" b="1" dirty="0" smtClean="0">
+                <a:solidFill>
+                  <a:schemeClr val="bg1"/>
+                </a:solidFill>
+              </a:rPr>
+              <a:t>&lt;&lt;interface&gt;&gt;</a:t>
+            </a:r>
+          </a:p>
+          <a:p>
+            <a:pPr algn="ctr"/>
+            <a:r>
               <a:rPr lang="en-US" sz="1050" b="1" dirty="0" err="1" smtClean="0">
                 <a:solidFill>
                   <a:schemeClr val="bg1"/>
                 </a:solidFill>
               </a:rPr>
-              <a:t>DateTimeManager</a:t>
+              <a:t>DateTimeParser</a:t>
             </a:r>
             <a:endParaRPr lang="en-US" sz="1050" b="1" dirty="0" smtClean="0">
               <a:solidFill>
@@ -6510,8 +6521,8 @@
         </p:nvCxnSpPr>
         <p:spPr>
           <a:xfrm rot="5400000" flipH="1" flipV="1">
-            <a:off x="1897874" y="3935803"/>
-            <a:ext cx="181402" cy="583845"/>
+            <a:off x="1905209" y="3924798"/>
+            <a:ext cx="185072" cy="602185"/>
           </a:xfrm>
           <a:prstGeom prst="bentConnector2">
             <a:avLst/>
@@ -6729,12 +6740,12 @@
         </p:nvCxnSpPr>
         <p:spPr>
           <a:xfrm rot="10800000">
-            <a:off x="3719109" y="3987833"/>
-            <a:ext cx="3347521" cy="644925"/>
+            <a:off x="3734410" y="3903575"/>
+            <a:ext cx="3347525" cy="701774"/>
           </a:xfrm>
           <a:prstGeom prst="bentConnector3">
             <a:avLst>
-              <a:gd name="adj1" fmla="val 82208"/>
+              <a:gd name="adj1" fmla="val 50000"/>
             </a:avLst>
           </a:prstGeom>
           <a:ln w="19050">
@@ -6992,8 +7003,8 @@
         </p:nvSpPr>
         <p:spPr>
           <a:xfrm>
-            <a:off x="6007916" y="760971"/>
-            <a:ext cx="1472140" cy="346760"/>
+            <a:off x="6438097" y="759571"/>
+            <a:ext cx="1562902" cy="346760"/>
           </a:xfrm>
           <a:prstGeom prst="rect">
             <a:avLst/>
@@ -7028,7 +7039,7 @@
           <a:p>
             <a:pPr algn="ctr"/>
             <a:r>
-              <a:rPr lang="en-US" sz="1050" smtClean="0">
+              <a:rPr lang="en-US" sz="1050" dirty="0" err="1" smtClean="0">
                 <a:solidFill>
                   <a:schemeClr val="bg1"/>
                 </a:solidFill>
@@ -7051,7 +7062,7 @@
         </p:nvSpPr>
         <p:spPr>
           <a:xfrm>
-            <a:off x="3892091" y="1267805"/>
+            <a:off x="5943142" y="1242225"/>
             <a:ext cx="1498362" cy="346760"/>
           </a:xfrm>
           <a:prstGeom prst="rect">
@@ -7125,7 +7136,7 @@
         </p:nvSpPr>
         <p:spPr>
           <a:xfrm>
-            <a:off x="6007916" y="1230497"/>
+            <a:off x="3703550" y="1284874"/>
             <a:ext cx="1688284" cy="346760"/>
           </a:xfrm>
           <a:prstGeom prst="rect">
@@ -7161,7 +7172,7 @@
           <a:p>
             <a:pPr algn="ctr"/>
             <a:r>
-              <a:rPr lang="en-US" sz="1050" smtClean="0">
+              <a:rPr lang="en-US" sz="1050" dirty="0" err="1" smtClean="0">
                 <a:solidFill>
                   <a:schemeClr val="bg1"/>
                 </a:solidFill>
@@ -7223,7 +7234,7 @@
         </p:nvSpPr>
         <p:spPr>
           <a:xfrm rot="5400000">
-            <a:off x="5807786" y="1315579"/>
+            <a:off x="5698820" y="1315128"/>
             <a:ext cx="270504" cy="175523"/>
           </a:xfrm>
           <a:prstGeom prst="triangle">
@@ -7272,13 +7283,15 @@
       <p:cxnSp>
         <p:nvCxnSpPr>
           <p:cNvPr id="160" name="Straight Arrow Connector 57"/>
-          <p:cNvCxnSpPr/>
+          <p:cNvCxnSpPr>
+            <a:endCxn id="154" idx="3"/>
+          </p:cNvCxnSpPr>
           <p:nvPr/>
         </p:nvCxnSpPr>
         <p:spPr>
-          <a:xfrm>
-            <a:off x="7696200" y="1403340"/>
-            <a:ext cx="735539" cy="0"/>
+          <a:xfrm flipH="1" flipV="1">
+            <a:off x="7441504" y="1415605"/>
+            <a:ext cx="994658" cy="4224"/>
           </a:xfrm>
           <a:prstGeom prst="straightConnector1">
             <a:avLst/>
@@ -7310,15 +7323,13 @@
       <p:cxnSp>
         <p:nvCxnSpPr>
           <p:cNvPr id="167" name="Straight Arrow Connector 57"/>
-          <p:cNvCxnSpPr>
-            <a:stCxn id="153" idx="3"/>
-          </p:cNvCxnSpPr>
+          <p:cNvCxnSpPr/>
           <p:nvPr/>
         </p:nvCxnSpPr>
         <p:spPr>
-          <a:xfrm flipV="1">
-            <a:off x="7480056" y="931636"/>
-            <a:ext cx="951683" cy="2715"/>
+          <a:xfrm flipH="1">
+            <a:off x="8001000" y="1006997"/>
+            <a:ext cx="435163" cy="0"/>
           </a:xfrm>
           <a:prstGeom prst="straightConnector1">
             <a:avLst/>
@@ -7355,8 +7366,8 @@
         </p:nvSpPr>
         <p:spPr>
           <a:xfrm flipH="1">
-            <a:off x="2330344" y="3244725"/>
-            <a:ext cx="1278268" cy="436099"/>
+            <a:off x="2330344" y="3244726"/>
+            <a:ext cx="1278268" cy="313676"/>
           </a:xfrm>
           <a:prstGeom prst="rect">
             <a:avLst/>
@@ -7387,23 +7398,12 @@
           <a:p>
             <a:pPr algn="ctr"/>
             <a:r>
-              <a:rPr lang="en-US" sz="1050" b="1" dirty="0" smtClean="0">
-                <a:solidFill>
-                  <a:schemeClr val="bg1"/>
-                </a:solidFill>
-              </a:rPr>
-              <a:t>&lt;&lt;interface&gt;&gt;</a:t>
-            </a:r>
-          </a:p>
-          <a:p>
-            <a:pPr algn="ctr"/>
-            <a:r>
               <a:rPr lang="en-US" sz="1050" b="1" dirty="0" err="1" smtClean="0">
                 <a:solidFill>
                   <a:schemeClr val="bg1"/>
                 </a:solidFill>
               </a:rPr>
-              <a:t>DateTimeParser</a:t>
+              <a:t>DateTimeManager</a:t>
             </a:r>
             <a:endParaRPr lang="en-SG" sz="1050" b="1" dirty="0">
               <a:solidFill>
@@ -7423,8 +7423,8 @@
         </p:nvCxnSpPr>
         <p:spPr>
           <a:xfrm rot="5400000" flipH="1" flipV="1">
-            <a:off x="1983119" y="3510947"/>
-            <a:ext cx="395397" cy="299054"/>
+            <a:off x="1952512" y="3480344"/>
+            <a:ext cx="456611" cy="299053"/>
           </a:xfrm>
           <a:prstGeom prst="bentConnector2">
             <a:avLst/>
@@ -7464,8 +7464,8 @@
         </p:nvCxnSpPr>
         <p:spPr>
           <a:xfrm rot="10800000">
-            <a:off x="2031290" y="3858174"/>
-            <a:ext cx="249206" cy="129659"/>
+            <a:off x="2046591" y="3830765"/>
+            <a:ext cx="249206" cy="72810"/>
           </a:xfrm>
           <a:prstGeom prst="bentConnector3">
             <a:avLst>
@@ -7499,68 +7499,14 @@
       </p:cxnSp>
       <p:sp>
         <p:nvSpPr>
-          <p:cNvPr id="112" name="Isosceles Triangle 102"/>
-          <p:cNvSpPr/>
-          <p:nvPr/>
-        </p:nvSpPr>
-        <p:spPr>
-          <a:xfrm rot="5400000">
-            <a:off x="2098917" y="3353044"/>
-            <a:ext cx="270504" cy="175523"/>
-          </a:xfrm>
-          <a:prstGeom prst="triangle">
-            <a:avLst/>
-          </a:prstGeom>
-          <a:solidFill>
-            <a:schemeClr val="tx2">
-              <a:lumMod val="60000"/>
-              <a:lumOff val="40000"/>
-            </a:schemeClr>
-          </a:solidFill>
-          <a:ln w="19050">
-            <a:solidFill>
-              <a:srgbClr val="0070C0"/>
-            </a:solidFill>
-          </a:ln>
-          <a:effectLst/>
-        </p:spPr>
-        <p:style>
-          <a:lnRef idx="1">
-            <a:schemeClr val="accent1"/>
-          </a:lnRef>
-          <a:fillRef idx="2">
-            <a:schemeClr val="accent1"/>
-          </a:fillRef>
-          <a:effectRef idx="1">
-            <a:schemeClr val="accent1"/>
-          </a:effectRef>
-          <a:fontRef idx="minor">
-            <a:schemeClr val="dk1"/>
-          </a:fontRef>
-        </p:style>
-        <p:txBody>
-          <a:bodyPr rtlCol="0" anchor="ctr"/>
-          <a:lstStyle/>
-          <a:p>
-            <a:pPr algn="ctr"/>
-            <a:endParaRPr lang="en-SG" sz="1050" b="1">
-              <a:solidFill>
-                <a:srgbClr val="92D050"/>
-              </a:solidFill>
-            </a:endParaRPr>
-          </a:p>
-        </p:txBody>
-      </p:sp>
-      <p:sp>
-        <p:nvSpPr>
           <p:cNvPr id="114" name="Rectangle 113"/>
           <p:cNvSpPr/>
           <p:nvPr/>
         </p:nvSpPr>
         <p:spPr>
           <a:xfrm flipH="1">
-            <a:off x="4755577" y="3905667"/>
-            <a:ext cx="1438612" cy="330193"/>
+            <a:off x="4755577" y="3800691"/>
+            <a:ext cx="1438612" cy="435169"/>
           </a:xfrm>
           <a:prstGeom prst="rect">
             <a:avLst/>
@@ -7591,12 +7537,23 @@
           <a:p>
             <a:pPr algn="ctr"/>
             <a:r>
+              <a:rPr lang="en-US" sz="1050" b="1" dirty="0" smtClean="0">
+                <a:solidFill>
+                  <a:schemeClr val="bg1"/>
+                </a:solidFill>
+              </a:rPr>
+              <a:t>&lt;&lt;interface&gt;&gt;</a:t>
+            </a:r>
+          </a:p>
+          <a:p>
+            <a:pPr algn="ctr"/>
+            <a:r>
               <a:rPr lang="en-US" sz="1050" b="1" dirty="0" err="1" smtClean="0">
                 <a:solidFill>
                   <a:schemeClr val="bg1"/>
                 </a:solidFill>
               </a:rPr>
-              <a:t>RecurrenceManager</a:t>
+              <a:t>RecurrenceParser</a:t>
             </a:r>
             <a:endParaRPr lang="en-US" sz="1050" b="1" dirty="0" smtClean="0">
               <a:solidFill>
@@ -7614,8 +7571,8 @@
         </p:nvSpPr>
         <p:spPr>
           <a:xfrm flipH="1">
-            <a:off x="4268643" y="3292587"/>
-            <a:ext cx="1278268" cy="436099"/>
+            <a:off x="4225618" y="3292587"/>
+            <a:ext cx="1321293" cy="296607"/>
           </a:xfrm>
           <a:prstGeom prst="rect">
             <a:avLst/>
@@ -7646,23 +7603,12 @@
           <a:p>
             <a:pPr algn="ctr"/>
             <a:r>
-              <a:rPr lang="en-US" sz="1050" b="1" dirty="0" smtClean="0">
-                <a:solidFill>
-                  <a:schemeClr val="bg1"/>
-                </a:solidFill>
-              </a:rPr>
-              <a:t>&lt;&lt;interface&gt;&gt;</a:t>
-            </a:r>
-          </a:p>
-          <a:p>
-            <a:pPr algn="ctr"/>
-            <a:r>
               <a:rPr lang="en-US" sz="1050" b="1" dirty="0" err="1" smtClean="0">
                 <a:solidFill>
                   <a:schemeClr val="bg1"/>
                 </a:solidFill>
               </a:rPr>
-              <a:t>RecurrenceParser</a:t>
+              <a:t>RecurrenceManager</a:t>
             </a:r>
             <a:endParaRPr lang="en-SG" sz="1050" b="1" dirty="0">
               <a:solidFill>
@@ -7682,8 +7628,8 @@
         </p:nvCxnSpPr>
         <p:spPr>
           <a:xfrm rot="10800000">
-            <a:off x="6194190" y="4070765"/>
-            <a:ext cx="855245" cy="660583"/>
+            <a:off x="6194190" y="4018277"/>
+            <a:ext cx="855249" cy="713075"/>
           </a:xfrm>
           <a:prstGeom prst="bentConnector3">
             <a:avLst>
@@ -7725,12 +7671,12 @@
         </p:nvCxnSpPr>
         <p:spPr>
           <a:xfrm flipV="1">
-            <a:off x="2244873" y="4070764"/>
-            <a:ext cx="2510704" cy="330087"/>
+            <a:off x="2244873" y="4018276"/>
+            <a:ext cx="2510704" cy="382576"/>
           </a:xfrm>
           <a:prstGeom prst="bentConnector3">
             <a:avLst>
-              <a:gd name="adj1" fmla="val 89682"/>
+              <a:gd name="adj1" fmla="val 85333"/>
             </a:avLst>
           </a:prstGeom>
           <a:ln w="19050">
@@ -7801,14 +7747,15 @@
         <p:nvCxnSpPr>
           <p:cNvPr id="128" name="Elbow Connector 63"/>
           <p:cNvCxnSpPr>
+            <a:stCxn id="77" idx="0"/>
             <a:endCxn id="115" idx="1"/>
           </p:cNvCxnSpPr>
           <p:nvPr/>
         </p:nvCxnSpPr>
         <p:spPr>
           <a:xfrm rot="16200000" flipV="1">
-            <a:off x="5537640" y="3519909"/>
-            <a:ext cx="383147" cy="364604"/>
+            <a:off x="5623009" y="3364793"/>
+            <a:ext cx="212416" cy="364611"/>
           </a:xfrm>
           <a:prstGeom prst="bentConnector2">
             <a:avLst/>
@@ -7838,15 +7785,93 @@
           </a:fontRef>
         </p:style>
       </p:cxnSp>
-      <p:sp>
-        <p:nvSpPr>
-          <p:cNvPr id="132" name="Isosceles Triangle 102"/>
+      <p:cxnSp>
+        <p:nvCxnSpPr>
+          <p:cNvPr id="111" name="Straight Arrow Connector 57"/>
+          <p:cNvCxnSpPr/>
+          <p:nvPr/>
+        </p:nvCxnSpPr>
+        <p:spPr>
+          <a:xfrm>
+            <a:off x="7948802" y="1116417"/>
+            <a:ext cx="8003" cy="4256615"/>
+          </a:xfrm>
+          <a:prstGeom prst="straightConnector1">
+            <a:avLst/>
+          </a:prstGeom>
+          <a:ln w="19050">
+            <a:solidFill>
+              <a:srgbClr val="0070C0"/>
+            </a:solidFill>
+            <a:headEnd type="none" w="med" len="med"/>
+            <a:tailEnd type="arrow" w="med" len="med"/>
+          </a:ln>
+          <a:effectLst/>
+        </p:spPr>
+        <p:style>
+          <a:lnRef idx="1">
+            <a:schemeClr val="accent2"/>
+          </a:lnRef>
+          <a:fillRef idx="2">
+            <a:schemeClr val="accent2"/>
+          </a:fillRef>
+          <a:effectRef idx="1">
+            <a:schemeClr val="accent2"/>
+          </a:effectRef>
+          <a:fontRef idx="minor">
+            <a:schemeClr val="dk1"/>
+          </a:fontRef>
+        </p:style>
+      </p:cxnSp>
+      <p:sp>
+        <p:nvSpPr>
+          <p:cNvPr id="77" name="Flowchart: Merge 76"/>
           <p:cNvSpPr/>
           <p:nvPr/>
         </p:nvSpPr>
         <p:spPr>
-          <a:xfrm rot="16200000">
-            <a:off x="5509411" y="3426824"/>
+          <a:xfrm>
+            <a:off x="5812643" y="3653307"/>
+            <a:ext cx="197758" cy="152400"/>
+          </a:xfrm>
+          <a:prstGeom prst="flowChartMerge">
+            <a:avLst/>
+          </a:prstGeom>
+        </p:spPr>
+        <p:style>
+          <a:lnRef idx="2">
+            <a:schemeClr val="accent1">
+              <a:shade val="50000"/>
+            </a:schemeClr>
+          </a:lnRef>
+          <a:fillRef idx="1">
+            <a:schemeClr val="accent1"/>
+          </a:fillRef>
+          <a:effectRef idx="0">
+            <a:schemeClr val="accent1"/>
+          </a:effectRef>
+          <a:fontRef idx="minor">
+            <a:schemeClr val="lt1"/>
+          </a:fontRef>
+        </p:style>
+        <p:txBody>
+          <a:bodyPr rtlCol="0" anchor="ctr"/>
+          <a:lstStyle/>
+          <a:p>
+            <a:pPr algn="ctr"/>
+            <a:endParaRPr lang="en-US"/>
+          </a:p>
+        </p:txBody>
+      </p:sp>
+      <p:sp>
+        <p:nvSpPr>
+          <p:cNvPr id="129" name="Isosceles Triangle 102"/>
+          <p:cNvSpPr/>
+          <p:nvPr/>
+        </p:nvSpPr>
+        <p:spPr>
+          <a:xfrm rot="5400000">
+            <a:off x="2098486" y="3787724"/>
             <a:ext cx="270504" cy="175523"/>
           </a:xfrm>
           <a:prstGeom prst="triangle">

</xml_diff>